<commit_message>
Added a change-threshold argument to smartcontroller and deleted unimplemented arguments. Made a README
</commit_message>
<xml_diff>
--- a/Automated PIN Cracking.pptx
+++ b/Automated PIN Cracking.pptx
@@ -30189,11 +30189,11 @@
         </c:dLbls>
         <c:marker val="1"/>
         <c:smooth val="0"/>
-        <c:axId val="78894592"/>
-        <c:axId val="135847232"/>
+        <c:axId val="113741312"/>
+        <c:axId val="75383360"/>
       </c:lineChart>
       <c:catAx>
-        <c:axId val="78894592"/>
+        <c:axId val="113741312"/>
         <c:scaling>
           <c:orientation val="minMax"/>
         </c:scaling>
@@ -30220,14 +30220,13 @@
               </a:p>
             </c:rich>
           </c:tx>
-          <c:layout/>
           <c:overlay val="0"/>
         </c:title>
         <c:numFmt formatCode="General" sourceLinked="1"/>
         <c:majorTickMark val="in"/>
         <c:minorTickMark val="none"/>
         <c:tickLblPos val="nextTo"/>
-        <c:crossAx val="135847232"/>
+        <c:crossAx val="75383360"/>
         <c:crosses val="autoZero"/>
         <c:auto val="1"/>
         <c:lblAlgn val="ctr"/>
@@ -30237,7 +30236,7 @@
         <c:noMultiLvlLbl val="0"/>
       </c:catAx>
       <c:valAx>
-        <c:axId val="135847232"/>
+        <c:axId val="75383360"/>
         <c:scaling>
           <c:orientation val="minMax"/>
           <c:max val="1"/>
@@ -30266,14 +30265,13 @@
               </a:p>
             </c:rich>
           </c:tx>
-          <c:layout/>
           <c:overlay val="0"/>
         </c:title>
         <c:numFmt formatCode="General" sourceLinked="1"/>
         <c:majorTickMark val="out"/>
         <c:minorTickMark val="none"/>
         <c:tickLblPos val="nextTo"/>
-        <c:crossAx val="78894592"/>
+        <c:crossAx val="113741312"/>
         <c:crosses val="autoZero"/>
         <c:crossBetween val="between"/>
       </c:valAx>
@@ -30644,7 +30642,7 @@
           <a:p>
             <a:fld id="{554E34B3-E155-47E4-AF6E-B183099F8DE6}" type="datetimeFigureOut">
               <a:rPr lang="en-US" smtClean="0"/>
-              <a:t>8/2/2013</a:t>
+              <a:t>8/3/2013</a:t>
             </a:fld>
             <a:endParaRPr lang="en-US"/>
           </a:p>
@@ -31285,7 +31283,7 @@
           <a:p>
             <a:fld id="{DAA86936-E1A1-4365-85F9-CA67DE8D6AE3}" type="datetimeFigureOut">
               <a:rPr lang="en-US" smtClean="0"/>
-              <a:t>8/2/2013</a:t>
+              <a:t>8/3/2013</a:t>
             </a:fld>
             <a:endParaRPr lang="en-US"/>
           </a:p>
@@ -31490,7 +31488,7 @@
           <a:p>
             <a:fld id="{DAA86936-E1A1-4365-85F9-CA67DE8D6AE3}" type="datetimeFigureOut">
               <a:rPr lang="en-US" smtClean="0"/>
-              <a:t>8/2/2013</a:t>
+              <a:t>8/3/2013</a:t>
             </a:fld>
             <a:endParaRPr lang="en-US"/>
           </a:p>
@@ -31759,7 +31757,7 @@
           <a:p>
             <a:fld id="{DAA86936-E1A1-4365-85F9-CA67DE8D6AE3}" type="datetimeFigureOut">
               <a:rPr lang="en-US" smtClean="0"/>
-              <a:t>8/2/2013</a:t>
+              <a:t>8/3/2013</a:t>
             </a:fld>
             <a:endParaRPr lang="en-US"/>
           </a:p>
@@ -32149,7 +32147,7 @@
           <a:p>
             <a:fld id="{DAA86936-E1A1-4365-85F9-CA67DE8D6AE3}" type="datetimeFigureOut">
               <a:rPr lang="en-US" smtClean="0"/>
-              <a:t>8/2/2013</a:t>
+              <a:t>8/3/2013</a:t>
             </a:fld>
             <a:endParaRPr lang="en-US"/>
           </a:p>
@@ -33320,7 +33318,7 @@
           <a:p>
             <a:fld id="{DAA86936-E1A1-4365-85F9-CA67DE8D6AE3}" type="datetimeFigureOut">
               <a:rPr lang="en-US" smtClean="0"/>
-              <a:t>8/2/2013</a:t>
+              <a:t>8/3/2013</a:t>
             </a:fld>
             <a:endParaRPr lang="en-US"/>
           </a:p>
@@ -33820,6 +33818,10 @@
                 <a:spcPts val="0"/>
               </a:spcBef>
             </a:pPr>
+            <a:r>
+              <a:rPr lang="en-US" sz="1800" dirty="0" smtClean="0"/>
+              <a:t>R2B2 and C3B0</a:t>
+            </a:r>
             <a:endParaRPr lang="en-US" sz="1800" dirty="0"/>
           </a:p>
         </p:txBody>
@@ -33841,9 +33843,18 @@
           <a:p>
             <a:r>
               <a:rPr lang="en-US" dirty="0" smtClean="0"/>
-              <a:t>Justin Engler	Paul Vines</a:t>
+              <a:t>Justin Engler	Paul </a:t>
             </a:r>
-            <a:endParaRPr lang="en-US" dirty="0"/>
+            <a:r>
+              <a:rPr lang="en-US" dirty="0" smtClean="0"/>
+              <a:t>Vines</a:t>
+            </a:r>
+          </a:p>
+          <a:p>
+            <a:r>
+              <a:rPr lang="en-US" dirty="0" smtClean="0"/>
+              <a:t>Senior Security Engineer	Security Engineering Intern</a:t>
+            </a:r>
           </a:p>
         </p:txBody>
       </p:sp>
@@ -34328,11 +34339,7 @@
           <a:p>
             <a:r>
               <a:rPr lang="en-US" dirty="0" smtClean="0"/>
-              <a:t>The original delta robot kit was modified to have its tool be a touch-screen stylus tip for pressing </a:t>
-            </a:r>
-            <a:r>
-              <a:rPr lang="en-US" dirty="0" smtClean="0"/>
-              <a:t>buttons</a:t>
+              <a:t>The original delta robot kit was modified to have its tool be a touch-screen stylus tip for pressing buttons</a:t>
             </a:r>
           </a:p>
           <a:p>
@@ -34687,7 +34694,6 @@
               <a:rPr lang="en-US" dirty="0" smtClean="0"/>
               <a:t>Doesn’t work.</a:t>
             </a:r>
-            <a:endParaRPr lang="en-US" dirty="0" smtClean="0"/>
           </a:p>
         </p:txBody>
       </p:sp>
@@ -34822,13 +34828,8 @@
             </a:r>
             <a:r>
               <a:rPr lang="en-US" dirty="0" smtClean="0"/>
-              <a:t> (danielamitay.com) phone app PIN </a:t>
+              <a:t> (danielamitay.com) phone app PIN list</a:t>
             </a:r>
-            <a:r>
-              <a:rPr lang="en-US" dirty="0" smtClean="0"/>
-              <a:t>list</a:t>
-            </a:r>
-            <a:endParaRPr lang="en-US" dirty="0" smtClean="0"/>
           </a:p>
         </p:txBody>
       </p:sp>
@@ -36297,11 +36298,7 @@
           <a:p>
             <a:r>
               <a:rPr lang="en-US" dirty="0" smtClean="0"/>
-              <a:t>Keyboard </a:t>
-            </a:r>
-            <a:r>
-              <a:rPr lang="en-US" dirty="0" smtClean="0"/>
-              <a:t>Emulation</a:t>
+              <a:t>Keyboard Emulation</a:t>
             </a:r>
           </a:p>
           <a:p>
@@ -36396,11 +36393,7 @@
           <a:p>
             <a:r>
               <a:rPr lang="en-US" dirty="0" smtClean="0"/>
-              <a:t>Keyboard </a:t>
-            </a:r>
-            <a:r>
-              <a:rPr lang="en-US" dirty="0" smtClean="0"/>
-              <a:t>Emulation</a:t>
+              <a:t>Keyboard Emulation</a:t>
             </a:r>
           </a:p>
           <a:p>
@@ -36408,7 +36401,6 @@
               <a:rPr lang="en-US" dirty="0" smtClean="0"/>
               <a:t>Brute Force the UI</a:t>
             </a:r>
-            <a:endParaRPr lang="en-US" dirty="0" smtClean="0"/>
           </a:p>
           <a:p>
             <a:r>

</xml_diff>